<commit_message>
TODO: add CNN accuracy.
</commit_message>
<xml_diff>
--- a/Urban Sound Classification.pptx
+++ b/Urban Sound Classification.pptx
@@ -12,12 +12,12 @@
     <p:sldId id="257" r:id="rId3"/>
     <p:sldId id="258" r:id="rId4"/>
     <p:sldId id="259" r:id="rId5"/>
-    <p:sldId id="260" r:id="rId6"/>
+    <p:sldId id="263" r:id="rId6"/>
     <p:sldId id="262" r:id="rId7"/>
-    <p:sldId id="263" r:id="rId8"/>
-    <p:sldId id="261" r:id="rId9"/>
+    <p:sldId id="260" r:id="rId8"/>
+    <p:sldId id="265" r:id="rId9"/>
     <p:sldId id="264" r:id="rId10"/>
-    <p:sldId id="265" r:id="rId11"/>
+    <p:sldId id="261" r:id="rId11"/>
   </p:sldIdLst>
   <p:sldSz cx="12192000" cy="6858000"/>
   <p:notesSz cx="6858000" cy="9144000"/>
@@ -206,7 +206,7 @@
           <a:p>
             <a:fld id="{341FECBC-EC0B-40F0-9F67-23CEB28D31CD}" type="datetimeFigureOut">
               <a:rPr lang="en-IN" smtClean="0"/>
-              <a:t>15-10-2018</a:t>
+              <a:t>22-10-2018</a:t>
             </a:fld>
             <a:endParaRPr lang="en-IN"/>
           </a:p>
@@ -547,7 +547,7 @@
           <a:p>
             <a:fld id="{5670911C-8B7B-4381-9438-FE983EBCFF96}" type="slidenum">
               <a:rPr lang="en-IN" smtClean="0"/>
-              <a:t>5</a:t>
+              <a:t>7</a:t>
             </a:fld>
             <a:endParaRPr lang="en-IN"/>
           </a:p>
@@ -6173,16 +6173,46 @@
           <a:p>
             <a:r>
               <a:rPr lang="en-IN" dirty="0" smtClean="0"/>
-              <a:t>Results (CNN)</a:t>
+              <a:t>Results (MLP)</a:t>
             </a:r>
             <a:endParaRPr lang="en-IN" dirty="0"/>
           </a:p>
         </p:txBody>
       </p:sp>
+      <p:pic>
+        <p:nvPicPr>
+          <p:cNvPr id="4" name="Picture 3"/>
+          <p:cNvPicPr>
+            <a:picLocks noChangeAspect="1"/>
+          </p:cNvPicPr>
+          <p:nvPr/>
+        </p:nvPicPr>
+        <p:blipFill>
+          <a:blip r:embed="rId2">
+            <a:extLst>
+              <a:ext uri="{28A0092B-C50C-407E-A947-70E740481C1C}">
+                <a14:useLocalDpi xmlns:a14="http://schemas.microsoft.com/office/drawing/2010/main" val="0"/>
+              </a:ext>
+            </a:extLst>
+          </a:blip>
+          <a:stretch>
+            <a:fillRect/>
+          </a:stretch>
+        </p:blipFill>
+        <p:spPr>
+          <a:xfrm>
+            <a:off x="1664456" y="2036884"/>
+            <a:ext cx="6362700" cy="4029075"/>
+          </a:xfrm>
+          <a:prstGeom prst="rect">
+            <a:avLst/>
+          </a:prstGeom>
+        </p:spPr>
+      </p:pic>
     </p:spTree>
     <p:extLst>
       <p:ext uri="{BB962C8B-B14F-4D97-AF65-F5344CB8AC3E}">
-        <p14:creationId xmlns:p14="http://schemas.microsoft.com/office/powerpoint/2010/main" val="1445810531"/>
+        <p14:creationId xmlns:p14="http://schemas.microsoft.com/office/powerpoint/2010/main" val="1301380024"/>
       </p:ext>
     </p:extLst>
   </p:cSld>
@@ -6659,10 +6689,7 @@
           <a:bodyPr/>
           <a:lstStyle/>
           <a:p>
-            <a:pPr marL="50800" indent="0">
-              <a:buNone/>
-            </a:pPr>
-            <a:endParaRPr lang="en-IN" dirty="0"/>
+            <a:endParaRPr lang="en-IN"/>
           </a:p>
         </p:txBody>
       </p:sp>
@@ -6683,16 +6710,46 @@
           <a:p>
             <a:r>
               <a:rPr lang="en-IN" dirty="0" smtClean="0"/>
-              <a:t>Architecture (MLP)</a:t>
+              <a:t>Architecture (CNN)</a:t>
             </a:r>
             <a:endParaRPr lang="en-IN" dirty="0"/>
           </a:p>
         </p:txBody>
       </p:sp>
+      <p:pic>
+        <p:nvPicPr>
+          <p:cNvPr id="4" name="Picture 3"/>
+          <p:cNvPicPr>
+            <a:picLocks noChangeAspect="1"/>
+          </p:cNvPicPr>
+          <p:nvPr/>
+        </p:nvPicPr>
+        <p:blipFill>
+          <a:blip r:embed="rId2" cstate="print">
+            <a:extLst>
+              <a:ext uri="{28A0092B-C50C-407E-A947-70E740481C1C}">
+                <a14:useLocalDpi xmlns:a14="http://schemas.microsoft.com/office/drawing/2010/main" val="0"/>
+              </a:ext>
+            </a:extLst>
+          </a:blip>
+          <a:stretch>
+            <a:fillRect/>
+          </a:stretch>
+        </p:blipFill>
+        <p:spPr>
+          <a:xfrm>
+            <a:off x="1884944" y="1856287"/>
+            <a:ext cx="5921724" cy="5001713"/>
+          </a:xfrm>
+          <a:prstGeom prst="rect">
+            <a:avLst/>
+          </a:prstGeom>
+        </p:spPr>
+      </p:pic>
     </p:spTree>
     <p:extLst>
       <p:ext uri="{BB962C8B-B14F-4D97-AF65-F5344CB8AC3E}">
-        <p14:creationId xmlns:p14="http://schemas.microsoft.com/office/powerpoint/2010/main" val="386085043"/>
+        <p14:creationId xmlns:p14="http://schemas.microsoft.com/office/powerpoint/2010/main" val="626010829"/>
       </p:ext>
     </p:extLst>
   </p:cSld>
@@ -6761,6 +6818,36 @@
           </a:p>
         </p:txBody>
       </p:sp>
+      <p:pic>
+        <p:nvPicPr>
+          <p:cNvPr id="4" name="Picture 3"/>
+          <p:cNvPicPr>
+            <a:picLocks noChangeAspect="1"/>
+          </p:cNvPicPr>
+          <p:nvPr/>
+        </p:nvPicPr>
+        <p:blipFill>
+          <a:blip r:embed="rId2" cstate="print">
+            <a:extLst>
+              <a:ext uri="{28A0092B-C50C-407E-A947-70E740481C1C}">
+                <a14:useLocalDpi xmlns:a14="http://schemas.microsoft.com/office/drawing/2010/main" val="0"/>
+              </a:ext>
+            </a:extLst>
+          </a:blip>
+          <a:stretch>
+            <a:fillRect/>
+          </a:stretch>
+        </p:blipFill>
+        <p:spPr>
+          <a:xfrm>
+            <a:off x="555145" y="1774946"/>
+            <a:ext cx="8581322" cy="5083054"/>
+          </a:xfrm>
+          <a:prstGeom prst="rect">
+            <a:avLst/>
+          </a:prstGeom>
+        </p:spPr>
+      </p:pic>
     </p:spTree>
     <p:extLst>
       <p:ext uri="{BB962C8B-B14F-4D97-AF65-F5344CB8AC3E}">
@@ -6806,7 +6893,10 @@
           <a:bodyPr/>
           <a:lstStyle/>
           <a:p>
-            <a:endParaRPr lang="en-IN"/>
+            <a:pPr marL="50800" indent="0">
+              <a:buNone/>
+            </a:pPr>
+            <a:endParaRPr lang="en-IN" dirty="0"/>
           </a:p>
         </p:txBody>
       </p:sp>
@@ -6827,16 +6917,46 @@
           <a:p>
             <a:r>
               <a:rPr lang="en-IN" dirty="0" smtClean="0"/>
-              <a:t>Architecture (CNN)</a:t>
+              <a:t>Architecture (MLP)</a:t>
             </a:r>
             <a:endParaRPr lang="en-IN" dirty="0"/>
           </a:p>
         </p:txBody>
       </p:sp>
+      <p:pic>
+        <p:nvPicPr>
+          <p:cNvPr id="4" name="Picture 3"/>
+          <p:cNvPicPr>
+            <a:picLocks noChangeAspect="1"/>
+          </p:cNvPicPr>
+          <p:nvPr/>
+        </p:nvPicPr>
+        <p:blipFill>
+          <a:blip r:embed="rId3" cstate="print">
+            <a:extLst>
+              <a:ext uri="{28A0092B-C50C-407E-A947-70E740481C1C}">
+                <a14:useLocalDpi xmlns:a14="http://schemas.microsoft.com/office/drawing/2010/main" val="0"/>
+              </a:ext>
+            </a:extLst>
+          </a:blip>
+          <a:stretch>
+            <a:fillRect/>
+          </a:stretch>
+        </p:blipFill>
+        <p:spPr>
+          <a:xfrm>
+            <a:off x="1406704" y="1809954"/>
+            <a:ext cx="6878204" cy="5048046"/>
+          </a:xfrm>
+          <a:prstGeom prst="rect">
+            <a:avLst/>
+          </a:prstGeom>
+        </p:spPr>
+      </p:pic>
     </p:spTree>
     <p:extLst>
       <p:ext uri="{BB962C8B-B14F-4D97-AF65-F5344CB8AC3E}">
-        <p14:creationId xmlns:p14="http://schemas.microsoft.com/office/powerpoint/2010/main" val="626010829"/>
+        <p14:creationId xmlns:p14="http://schemas.microsoft.com/office/powerpoint/2010/main" val="386085043"/>
       </p:ext>
     </p:extLst>
   </p:cSld>
@@ -6899,7 +7019,7 @@
           <a:p>
             <a:r>
               <a:rPr lang="en-IN" dirty="0" smtClean="0"/>
-              <a:t>Results (MLP)</a:t>
+              <a:t>Results (CNN)</a:t>
             </a:r>
             <a:endParaRPr lang="en-IN" dirty="0"/>
           </a:p>
@@ -6908,7 +7028,7 @@
     </p:spTree>
     <p:extLst>
       <p:ext uri="{BB962C8B-B14F-4D97-AF65-F5344CB8AC3E}">
-        <p14:creationId xmlns:p14="http://schemas.microsoft.com/office/powerpoint/2010/main" val="1301380024"/>
+        <p14:creationId xmlns:p14="http://schemas.microsoft.com/office/powerpoint/2010/main" val="1445810531"/>
       </p:ext>
     </p:extLst>
   </p:cSld>
@@ -6977,6 +7097,36 @@
           </a:p>
         </p:txBody>
       </p:sp>
+      <p:pic>
+        <p:nvPicPr>
+          <p:cNvPr id="4" name="Picture 3"/>
+          <p:cNvPicPr>
+            <a:picLocks noChangeAspect="1"/>
+          </p:cNvPicPr>
+          <p:nvPr/>
+        </p:nvPicPr>
+        <p:blipFill>
+          <a:blip r:embed="rId2">
+            <a:extLst>
+              <a:ext uri="{28A0092B-C50C-407E-A947-70E740481C1C}">
+                <a14:useLocalDpi xmlns:a14="http://schemas.microsoft.com/office/drawing/2010/main" val="0"/>
+              </a:ext>
+            </a:extLst>
+          </a:blip>
+          <a:stretch>
+            <a:fillRect/>
+          </a:stretch>
+        </p:blipFill>
+        <p:spPr>
+          <a:xfrm>
+            <a:off x="1664456" y="2185416"/>
+            <a:ext cx="6362700" cy="4029075"/>
+          </a:xfrm>
+          <a:prstGeom prst="rect">
+            <a:avLst/>
+          </a:prstGeom>
+        </p:spPr>
+      </p:pic>
     </p:spTree>
     <p:extLst>
       <p:ext uri="{BB962C8B-B14F-4D97-AF65-F5344CB8AC3E}">

</xml_diff>